<commit_message>
few changes for chapter three
</commit_message>
<xml_diff>
--- a/Unit Three.pptx
+++ b/Unit Three.pptx
@@ -5,7 +5,7 @@
     <p:sldMasterId id="2147483648" r:id="rId1"/>
   </p:sldMasterIdLst>
   <p:notesMasterIdLst>
-    <p:notesMasterId r:id="rId50"/>
+    <p:notesMasterId r:id="rId52"/>
   </p:notesMasterIdLst>
   <p:sldIdLst>
     <p:sldId id="256" r:id="rId2"/>
@@ -53,9 +53,11 @@
     <p:sldId id="339" r:id="rId44"/>
     <p:sldId id="340" r:id="rId45"/>
     <p:sldId id="341" r:id="rId46"/>
-    <p:sldId id="342" r:id="rId47"/>
-    <p:sldId id="343" r:id="rId48"/>
-    <p:sldId id="295" r:id="rId49"/>
+    <p:sldId id="345" r:id="rId47"/>
+    <p:sldId id="344" r:id="rId48"/>
+    <p:sldId id="342" r:id="rId49"/>
+    <p:sldId id="343" r:id="rId50"/>
+    <p:sldId id="295" r:id="rId51"/>
   </p:sldIdLst>
   <p:sldSz cx="12192000" cy="6858000"/>
   <p:notesSz cx="6858000" cy="9144000"/>
@@ -244,7 +246,7 @@
           <a:p>
             <a:fld id="{416375BE-C004-4A04-BDA8-C1CCAC3CCBD2}" type="datetimeFigureOut">
               <a:rPr lang="en-US" smtClean="0"/>
-              <a:t>3/27/2024</a:t>
+              <a:t>4/18/2024</a:t>
             </a:fld>
             <a:endParaRPr lang="en-US"/>
           </a:p>
@@ -2349,7 +2351,7 @@
     </p:spTree>
     <p:extLst>
       <p:ext uri="{BB962C8B-B14F-4D97-AF65-F5344CB8AC3E}">
-        <p14:creationId xmlns:p14="http://schemas.microsoft.com/office/powerpoint/2010/main" val="763189129"/>
+        <p14:creationId xmlns:p14="http://schemas.microsoft.com/office/powerpoint/2010/main" val="3424586607"/>
       </p:ext>
     </p:extLst>
   </p:cSld>
@@ -2509,6 +2511,174 @@
             <a:fld id="{CCD20DA7-1B92-47C0-9893-D6F9E1321E83}" type="slidenum">
               <a:rPr lang="en-US" smtClean="0"/>
               <a:t>47</a:t>
+            </a:fld>
+            <a:endParaRPr lang="en-US"/>
+          </a:p>
+        </p:txBody>
+      </p:sp>
+    </p:spTree>
+    <p:extLst>
+      <p:ext uri="{BB962C8B-B14F-4D97-AF65-F5344CB8AC3E}">
+        <p14:creationId xmlns:p14="http://schemas.microsoft.com/office/powerpoint/2010/main" val="2036780660"/>
+      </p:ext>
+    </p:extLst>
+  </p:cSld>
+  <p:clrMapOvr>
+    <a:masterClrMapping/>
+  </p:clrMapOvr>
+</p:notes>
+</file>
+
+<file path=ppt/notesSlides/notesSlide31.xml><?xml version="1.0" encoding="utf-8"?>
+<p:notes xmlns:a="http://schemas.openxmlformats.org/drawingml/2006/main" xmlns:r="http://schemas.openxmlformats.org/officeDocument/2006/relationships" xmlns:p="http://schemas.openxmlformats.org/presentationml/2006/main">
+  <p:cSld>
+    <p:spTree>
+      <p:nvGrpSpPr>
+        <p:cNvPr id="1" name=""/>
+        <p:cNvGrpSpPr/>
+        <p:nvPr/>
+      </p:nvGrpSpPr>
+      <p:grpSpPr>
+        <a:xfrm>
+          <a:off x="0" y="0"/>
+          <a:ext cx="0" cy="0"/>
+          <a:chOff x="0" y="0"/>
+          <a:chExt cx="0" cy="0"/>
+        </a:xfrm>
+      </p:grpSpPr>
+      <p:sp>
+        <p:nvSpPr>
+          <p:cNvPr id="2" name="Slide Image Placeholder 1"/>
+          <p:cNvSpPr>
+            <a:spLocks noGrp="1" noRot="1" noChangeAspect="1"/>
+          </p:cNvSpPr>
+          <p:nvPr>
+            <p:ph type="sldImg"/>
+          </p:nvPr>
+        </p:nvSpPr>
+        <p:spPr/>
+      </p:sp>
+      <p:sp>
+        <p:nvSpPr>
+          <p:cNvPr id="3" name="Notes Placeholder 2"/>
+          <p:cNvSpPr>
+            <a:spLocks noGrp="1"/>
+          </p:cNvSpPr>
+          <p:nvPr>
+            <p:ph type="body" idx="1"/>
+          </p:nvPr>
+        </p:nvSpPr>
+        <p:spPr/>
+        <p:txBody>
+          <a:bodyPr/>
+          <a:lstStyle/>
+          <a:p>
+            <a:endParaRPr lang="en-US" dirty="0"/>
+          </a:p>
+        </p:txBody>
+      </p:sp>
+      <p:sp>
+        <p:nvSpPr>
+          <p:cNvPr id="4" name="Slide Number Placeholder 3"/>
+          <p:cNvSpPr>
+            <a:spLocks noGrp="1"/>
+          </p:cNvSpPr>
+          <p:nvPr>
+            <p:ph type="sldNum" sz="quarter" idx="5"/>
+          </p:nvPr>
+        </p:nvSpPr>
+        <p:spPr/>
+        <p:txBody>
+          <a:bodyPr/>
+          <a:lstStyle/>
+          <a:p>
+            <a:fld id="{CCD20DA7-1B92-47C0-9893-D6F9E1321E83}" type="slidenum">
+              <a:rPr lang="en-US" smtClean="0"/>
+              <a:t>48</a:t>
+            </a:fld>
+            <a:endParaRPr lang="en-US"/>
+          </a:p>
+        </p:txBody>
+      </p:sp>
+    </p:spTree>
+    <p:extLst>
+      <p:ext uri="{BB962C8B-B14F-4D97-AF65-F5344CB8AC3E}">
+        <p14:creationId xmlns:p14="http://schemas.microsoft.com/office/powerpoint/2010/main" val="763189129"/>
+      </p:ext>
+    </p:extLst>
+  </p:cSld>
+  <p:clrMapOvr>
+    <a:masterClrMapping/>
+  </p:clrMapOvr>
+</p:notes>
+</file>
+
+<file path=ppt/notesSlides/notesSlide32.xml><?xml version="1.0" encoding="utf-8"?>
+<p:notes xmlns:a="http://schemas.openxmlformats.org/drawingml/2006/main" xmlns:r="http://schemas.openxmlformats.org/officeDocument/2006/relationships" xmlns:p="http://schemas.openxmlformats.org/presentationml/2006/main">
+  <p:cSld>
+    <p:spTree>
+      <p:nvGrpSpPr>
+        <p:cNvPr id="1" name=""/>
+        <p:cNvGrpSpPr/>
+        <p:nvPr/>
+      </p:nvGrpSpPr>
+      <p:grpSpPr>
+        <a:xfrm>
+          <a:off x="0" y="0"/>
+          <a:ext cx="0" cy="0"/>
+          <a:chOff x="0" y="0"/>
+          <a:chExt cx="0" cy="0"/>
+        </a:xfrm>
+      </p:grpSpPr>
+      <p:sp>
+        <p:nvSpPr>
+          <p:cNvPr id="2" name="Slide Image Placeholder 1"/>
+          <p:cNvSpPr>
+            <a:spLocks noGrp="1" noRot="1" noChangeAspect="1"/>
+          </p:cNvSpPr>
+          <p:nvPr>
+            <p:ph type="sldImg"/>
+          </p:nvPr>
+        </p:nvSpPr>
+        <p:spPr/>
+      </p:sp>
+      <p:sp>
+        <p:nvSpPr>
+          <p:cNvPr id="3" name="Notes Placeholder 2"/>
+          <p:cNvSpPr>
+            <a:spLocks noGrp="1"/>
+          </p:cNvSpPr>
+          <p:nvPr>
+            <p:ph type="body" idx="1"/>
+          </p:nvPr>
+        </p:nvSpPr>
+        <p:spPr/>
+        <p:txBody>
+          <a:bodyPr/>
+          <a:lstStyle/>
+          <a:p>
+            <a:endParaRPr lang="en-US" dirty="0"/>
+          </a:p>
+        </p:txBody>
+      </p:sp>
+      <p:sp>
+        <p:nvSpPr>
+          <p:cNvPr id="4" name="Slide Number Placeholder 3"/>
+          <p:cNvSpPr>
+            <a:spLocks noGrp="1"/>
+          </p:cNvSpPr>
+          <p:nvPr>
+            <p:ph type="sldNum" sz="quarter" idx="5"/>
+          </p:nvPr>
+        </p:nvSpPr>
+        <p:spPr/>
+        <p:txBody>
+          <a:bodyPr/>
+          <a:lstStyle/>
+          <a:p>
+            <a:fld id="{CCD20DA7-1B92-47C0-9893-D6F9E1321E83}" type="slidenum">
+              <a:rPr lang="en-US" smtClean="0"/>
+              <a:t>49</a:t>
             </a:fld>
             <a:endParaRPr lang="en-US"/>
           </a:p>
@@ -17193,12 +17363,16 @@
               <a:buNone/>
             </a:pPr>
             <a:r>
-              <a:rPr lang="en-US" sz="2100" dirty="0">
+              <a:rPr lang="en-US" sz="2100">
                 <a:latin typeface="Times New Roman" panose="02020603050405020304" pitchFamily="18" charset="0"/>
                 <a:cs typeface="Times New Roman" panose="02020603050405020304" pitchFamily="18" charset="0"/>
               </a:rPr>
               <a:t>&lt;library&gt;</a:t>
             </a:r>
+            <a:endParaRPr lang="en-US" sz="2100" dirty="0">
+              <a:latin typeface="Times New Roman" panose="02020603050405020304" pitchFamily="18" charset="0"/>
+              <a:cs typeface="Times New Roman" panose="02020603050405020304" pitchFamily="18" charset="0"/>
+            </a:endParaRPr>
           </a:p>
           <a:p>
             <a:pPr marL="1371600" lvl="3" indent="0" algn="just">
@@ -20831,7 +21005,7 @@
                 <a:latin typeface="Times New Roman" panose="02020603050405020304" pitchFamily="18" charset="0"/>
                 <a:cs typeface="Times New Roman" panose="02020603050405020304" pitchFamily="18" charset="0"/>
               </a:rPr>
-              <a:t>Introduction to XPath</a:t>
+              <a:t>XML DOM (1) – What is the DOM?</a:t>
             </a:r>
           </a:p>
         </p:txBody>
@@ -20854,8 +21028,8 @@
         </p:nvSpPr>
         <p:spPr>
           <a:xfrm>
-            <a:off x="720757" y="1551615"/>
-            <a:ext cx="10750485" cy="3754769"/>
+            <a:off x="720757" y="962025"/>
+            <a:ext cx="10750485" cy="5394325"/>
           </a:xfrm>
         </p:spPr>
         <p:txBody>
@@ -20866,18 +21040,47 @@
           <a:p>
             <a:pPr algn="just"/>
             <a:r>
+              <a:rPr lang="en-US" sz="2100" dirty="0">
+                <a:latin typeface="Times New Roman" panose="02020603050405020304" pitchFamily="18" charset="0"/>
+                <a:cs typeface="Times New Roman" panose="02020603050405020304" pitchFamily="18" charset="0"/>
+              </a:rPr>
+              <a:t>The Document Object Model (DOM) defines a standard for accessing and manipulating documents:</a:t>
+            </a:r>
+          </a:p>
+          <a:p>
+            <a:pPr marL="457200" lvl="1" indent="0" algn="just">
+              <a:buNone/>
+            </a:pPr>
+            <a:r>
+              <a:rPr lang="en-US" sz="2000" i="1" dirty="0">
+                <a:latin typeface="Times New Roman" panose="02020603050405020304" pitchFamily="18" charset="0"/>
+                <a:cs typeface="Times New Roman" panose="02020603050405020304" pitchFamily="18" charset="0"/>
+              </a:rPr>
+              <a:t>"The W3C Document Object Model (DOM) is a platform and language-neutral interface that allows programs and scripts to dynamically access and update the content, structure, and style of a document.“</a:t>
+            </a:r>
+          </a:p>
+          <a:p>
+            <a:pPr algn="just"/>
+            <a:r>
+              <a:rPr lang="en-US" sz="2100" dirty="0">
+                <a:latin typeface="Times New Roman" panose="02020603050405020304" pitchFamily="18" charset="0"/>
+                <a:cs typeface="Times New Roman" panose="02020603050405020304" pitchFamily="18" charset="0"/>
+              </a:rPr>
+              <a:t>The </a:t>
+            </a:r>
+            <a:r>
               <a:rPr lang="en-US" sz="2100" b="1" dirty="0">
                 <a:latin typeface="Times New Roman" panose="02020603050405020304" pitchFamily="18" charset="0"/>
                 <a:cs typeface="Times New Roman" panose="02020603050405020304" pitchFamily="18" charset="0"/>
               </a:rPr>
-              <a:t>XPath (XML Path Language) </a:t>
-            </a:r>
-            <a:r>
-              <a:rPr lang="en-US" sz="2100" dirty="0">
-                <a:latin typeface="Times New Roman" panose="02020603050405020304" pitchFamily="18" charset="0"/>
-                <a:cs typeface="Times New Roman" panose="02020603050405020304" pitchFamily="18" charset="0"/>
-              </a:rPr>
-              <a:t>is a language used to navigate and select elements and attributes in XML documents.</a:t>
+              <a:t>HTML DOM </a:t>
+            </a:r>
+            <a:r>
+              <a:rPr lang="en-US" sz="2100" dirty="0">
+                <a:latin typeface="Times New Roman" panose="02020603050405020304" pitchFamily="18" charset="0"/>
+                <a:cs typeface="Times New Roman" panose="02020603050405020304" pitchFamily="18" charset="0"/>
+              </a:rPr>
+              <a:t>defines a standard way for accessing and manipulating HTML documents. It presents an HTML document as a tree-structure.</a:t>
             </a:r>
           </a:p>
           <a:p>
@@ -20887,81 +21090,113 @@
                 <a:latin typeface="Times New Roman" panose="02020603050405020304" pitchFamily="18" charset="0"/>
                 <a:cs typeface="Times New Roman" panose="02020603050405020304" pitchFamily="18" charset="0"/>
               </a:rPr>
-              <a:t>Imagine an XML document as a tree-like structure, with elements (nodes) and attributes (properties).</a:t>
+              <a:t>The </a:t>
+            </a:r>
+            <a:r>
+              <a:rPr lang="en-US" sz="2100" b="1" dirty="0">
+                <a:latin typeface="Times New Roman" panose="02020603050405020304" pitchFamily="18" charset="0"/>
+                <a:cs typeface="Times New Roman" panose="02020603050405020304" pitchFamily="18" charset="0"/>
+              </a:rPr>
+              <a:t>XML DOM </a:t>
+            </a:r>
+            <a:r>
+              <a:rPr lang="en-US" sz="2100" dirty="0">
+                <a:latin typeface="Times New Roman" panose="02020603050405020304" pitchFamily="18" charset="0"/>
+                <a:cs typeface="Times New Roman" panose="02020603050405020304" pitchFamily="18" charset="0"/>
+              </a:rPr>
+              <a:t>defines a standard way for accessing and manipulating XML documents. It presents an XML document as a tree-structure.</a:t>
             </a:r>
           </a:p>
           <a:p>
             <a:pPr algn="just"/>
             <a:r>
-              <a:rPr lang="en-US" sz="2100" dirty="0">
-                <a:latin typeface="Times New Roman" panose="02020603050405020304" pitchFamily="18" charset="0"/>
-                <a:cs typeface="Times New Roman" panose="02020603050405020304" pitchFamily="18" charset="0"/>
-              </a:rPr>
-              <a:t>XPath is like a map that helps you navigate this tree and find specific elements or attributes you're interested in.</a:t>
-            </a:r>
+              <a:rPr lang="en-US" sz="2100" b="1" dirty="0">
+                <a:latin typeface="Times New Roman" panose="02020603050405020304" pitchFamily="18" charset="0"/>
+                <a:cs typeface="Times New Roman" panose="02020603050405020304" pitchFamily="18" charset="0"/>
+              </a:rPr>
+              <a:t>What is XML Parser?</a:t>
+            </a:r>
+          </a:p>
+          <a:p>
+            <a:pPr lvl="1" algn="just">
+              <a:buFont typeface="Wingdings" panose="05000000000000000000" pitchFamily="2" charset="2"/>
+              <a:buChar char="§"/>
+            </a:pPr>
+            <a:r>
+              <a:rPr lang="en-US" sz="2000" dirty="0">
+                <a:latin typeface="Times New Roman" panose="02020603050405020304" pitchFamily="18" charset="0"/>
+                <a:cs typeface="Times New Roman" panose="02020603050405020304" pitchFamily="18" charset="0"/>
+              </a:rPr>
+              <a:t>The </a:t>
+            </a:r>
+            <a:r>
+              <a:rPr lang="en-US" sz="2000" b="1" dirty="0">
+                <a:latin typeface="Times New Roman" panose="02020603050405020304" pitchFamily="18" charset="0"/>
+                <a:cs typeface="Times New Roman" panose="02020603050405020304" pitchFamily="18" charset="0"/>
+              </a:rPr>
+              <a:t>XML DOM (Document Object Model) </a:t>
+            </a:r>
+            <a:r>
+              <a:rPr lang="en-US" sz="2000" dirty="0">
+                <a:latin typeface="Times New Roman" panose="02020603050405020304" pitchFamily="18" charset="0"/>
+                <a:cs typeface="Times New Roman" panose="02020603050405020304" pitchFamily="18" charset="0"/>
+              </a:rPr>
+              <a:t>defines the properties and methods for accessing and editing XML.</a:t>
+            </a:r>
+          </a:p>
+          <a:p>
+            <a:pPr lvl="1" algn="just">
+              <a:buFont typeface="Wingdings" panose="05000000000000000000" pitchFamily="2" charset="2"/>
+              <a:buChar char="§"/>
+            </a:pPr>
+            <a:r>
+              <a:rPr lang="en-US" sz="2000" dirty="0">
+                <a:latin typeface="Times New Roman" panose="02020603050405020304" pitchFamily="18" charset="0"/>
+                <a:cs typeface="Times New Roman" panose="02020603050405020304" pitchFamily="18" charset="0"/>
+              </a:rPr>
+              <a:t>However, before an XML document can be accessed, it must be loaded into an XML DOM object.</a:t>
+            </a:r>
+          </a:p>
+          <a:p>
+            <a:pPr lvl="1" algn="just">
+              <a:buFont typeface="Wingdings" panose="05000000000000000000" pitchFamily="2" charset="2"/>
+              <a:buChar char="§"/>
+            </a:pPr>
+            <a:r>
+              <a:rPr lang="en-US" sz="2000" dirty="0">
+                <a:latin typeface="Times New Roman" panose="02020603050405020304" pitchFamily="18" charset="0"/>
+                <a:cs typeface="Times New Roman" panose="02020603050405020304" pitchFamily="18" charset="0"/>
+              </a:rPr>
+              <a:t>All modern browsers have a built-in XML parser that can convert text into an XML DOM object.</a:t>
+            </a:r>
+          </a:p>
+          <a:p>
+            <a:pPr marL="0" indent="0" algn="just">
+              <a:buNone/>
+            </a:pPr>
+            <a:endParaRPr lang="en-US" sz="2100" dirty="0">
+              <a:latin typeface="Times New Roman" panose="02020603050405020304" pitchFamily="18" charset="0"/>
+              <a:cs typeface="Times New Roman" panose="02020603050405020304" pitchFamily="18" charset="0"/>
+            </a:endParaRPr>
+          </a:p>
+          <a:p>
+            <a:pPr marL="0" indent="0" algn="just">
+              <a:buNone/>
+            </a:pPr>
+            <a:endParaRPr lang="en-US" sz="2100" dirty="0">
+              <a:latin typeface="Times New Roman" panose="02020603050405020304" pitchFamily="18" charset="0"/>
+              <a:cs typeface="Times New Roman" panose="02020603050405020304" pitchFamily="18" charset="0"/>
+            </a:endParaRPr>
           </a:p>
           <a:p>
             <a:pPr algn="just"/>
-            <a:r>
-              <a:rPr lang="en-US" sz="2100" dirty="0">
-                <a:latin typeface="Times New Roman" panose="02020603050405020304" pitchFamily="18" charset="0"/>
-                <a:cs typeface="Times New Roman" panose="02020603050405020304" pitchFamily="18" charset="0"/>
-              </a:rPr>
-              <a:t>It uses a concise syntax to describe paths to reach nodes, similar to directories in a file system.</a:t>
-            </a:r>
+            <a:endParaRPr lang="en-US" sz="2100" dirty="0">
+              <a:latin typeface="Times New Roman" panose="02020603050405020304" pitchFamily="18" charset="0"/>
+              <a:cs typeface="Times New Roman" panose="02020603050405020304" pitchFamily="18" charset="0"/>
+            </a:endParaRPr>
           </a:p>
           <a:p>
             <a:pPr algn="just"/>
-            <a:r>
-              <a:rPr lang="en-US" sz="2100" b="1" dirty="0">
-                <a:latin typeface="Times New Roman" panose="02020603050405020304" pitchFamily="18" charset="0"/>
-                <a:cs typeface="Times New Roman" panose="02020603050405020304" pitchFamily="18" charset="0"/>
-              </a:rPr>
-              <a:t>For example, </a:t>
-            </a:r>
-            <a:r>
-              <a:rPr lang="en-US" sz="2100" dirty="0">
-                <a:latin typeface="Times New Roman" panose="02020603050405020304" pitchFamily="18" charset="0"/>
-                <a:cs typeface="Times New Roman" panose="02020603050405020304" pitchFamily="18" charset="0"/>
-              </a:rPr>
-              <a:t>given an XML document representing books, the XPath expression “</a:t>
-            </a:r>
-            <a:r>
-              <a:rPr lang="en-US" sz="2100" b="1" dirty="0">
-                <a:latin typeface="Times New Roman" panose="02020603050405020304" pitchFamily="18" charset="0"/>
-                <a:cs typeface="Times New Roman" panose="02020603050405020304" pitchFamily="18" charset="0"/>
-              </a:rPr>
-              <a:t>/books/book[1]/title”</a:t>
-            </a:r>
-            <a:r>
-              <a:rPr lang="en-US" sz="2100" dirty="0">
-                <a:latin typeface="Times New Roman" panose="02020603050405020304" pitchFamily="18" charset="0"/>
-                <a:cs typeface="Times New Roman" panose="02020603050405020304" pitchFamily="18" charset="0"/>
-              </a:rPr>
-              <a:t> points to the title of the first book in the "books" element.</a:t>
-            </a:r>
-          </a:p>
-          <a:p>
-            <a:pPr algn="just"/>
-            <a:r>
-              <a:rPr lang="en-US" sz="2100" b="1" dirty="0">
-                <a:latin typeface="Times New Roman" panose="02020603050405020304" pitchFamily="18" charset="0"/>
-                <a:cs typeface="Times New Roman" panose="02020603050405020304" pitchFamily="18" charset="0"/>
-              </a:rPr>
-              <a:t>Note: </a:t>
-            </a:r>
-            <a:r>
-              <a:rPr lang="en-US" sz="2100" dirty="0">
-                <a:latin typeface="Times New Roman" panose="02020603050405020304" pitchFamily="18" charset="0"/>
-                <a:cs typeface="Times New Roman" panose="02020603050405020304" pitchFamily="18" charset="0"/>
-              </a:rPr>
-              <a:t>In XPath, the index for nodes or elements start from 1 not 0.</a:t>
-            </a:r>
-          </a:p>
-          <a:p>
-            <a:pPr marL="0" indent="0" algn="just">
-              <a:buNone/>
-            </a:pPr>
             <a:endParaRPr lang="en-US" sz="2100" dirty="0">
               <a:latin typeface="Times New Roman" panose="02020603050405020304" pitchFamily="18" charset="0"/>
               <a:cs typeface="Times New Roman" panose="02020603050405020304" pitchFamily="18" charset="0"/>
@@ -21115,7 +21350,7 @@
                 <a:latin typeface="Times New Roman" panose="02020603050405020304" pitchFamily="18" charset="0"/>
                 <a:cs typeface="Times New Roman" panose="02020603050405020304" pitchFamily="18" charset="0"/>
               </a:rPr>
-              <a:t>Introduction to XSLT</a:t>
+              <a:t>XML DOM (2) – HTML DOM Example</a:t>
             </a:r>
           </a:p>
         </p:txBody>
@@ -21138,8 +21373,8 @@
         </p:nvSpPr>
         <p:spPr>
           <a:xfrm>
-            <a:off x="838200" y="1821730"/>
-            <a:ext cx="10750485" cy="3214539"/>
+            <a:off x="720757" y="2207913"/>
+            <a:ext cx="10750485" cy="2764137"/>
           </a:xfrm>
         </p:spPr>
         <p:txBody>
@@ -21148,83 +21383,65 @@
           </a:bodyPr>
           <a:lstStyle/>
           <a:p>
-            <a:pPr algn="just"/>
-            <a:r>
-              <a:rPr lang="en-US" sz="2100" b="1" dirty="0" err="1">
-                <a:latin typeface="Times New Roman" panose="02020603050405020304" pitchFamily="18" charset="0"/>
-                <a:cs typeface="Times New Roman" panose="02020603050405020304" pitchFamily="18" charset="0"/>
-              </a:rPr>
-              <a:t>eXtensible</a:t>
-            </a:r>
-            <a:r>
-              <a:rPr lang="en-US" sz="2100" b="1" dirty="0">
-                <a:latin typeface="Times New Roman" panose="02020603050405020304" pitchFamily="18" charset="0"/>
-                <a:cs typeface="Times New Roman" panose="02020603050405020304" pitchFamily="18" charset="0"/>
-              </a:rPr>
-              <a:t> Stylesheet Language Transformations (XSLT) </a:t>
-            </a:r>
-            <a:r>
-              <a:rPr lang="en-US" sz="2100" dirty="0">
-                <a:latin typeface="Times New Roman" panose="02020603050405020304" pitchFamily="18" charset="0"/>
-                <a:cs typeface="Times New Roman" panose="02020603050405020304" pitchFamily="18" charset="0"/>
-              </a:rPr>
-              <a:t>is like a set of rules or templates that instruct how to transform XML data into a different format.</a:t>
-            </a:r>
-          </a:p>
-          <a:p>
-            <a:pPr algn="just"/>
-            <a:r>
-              <a:rPr lang="en-US" sz="2100" dirty="0">
-                <a:latin typeface="Times New Roman" panose="02020603050405020304" pitchFamily="18" charset="0"/>
-                <a:cs typeface="Times New Roman" panose="02020603050405020304" pitchFamily="18" charset="0"/>
-              </a:rPr>
-              <a:t>You define these templates to specify how to display, format, or extract data from the XML document.</a:t>
-            </a:r>
-          </a:p>
-          <a:p>
-            <a:pPr algn="just"/>
-            <a:r>
-              <a:rPr lang="en-US" sz="2100" dirty="0">
-                <a:latin typeface="Times New Roman" panose="02020603050405020304" pitchFamily="18" charset="0"/>
-                <a:cs typeface="Times New Roman" panose="02020603050405020304" pitchFamily="18" charset="0"/>
-              </a:rPr>
-              <a:t>Think of XSLT as a recipe that takes an XML input and turns it into another XML, HTML, or even plain text output.</a:t>
-            </a:r>
-          </a:p>
-          <a:p>
-            <a:pPr algn="just"/>
-            <a:r>
-              <a:rPr lang="en-US" sz="2100" b="1" dirty="0">
-                <a:latin typeface="Times New Roman" panose="02020603050405020304" pitchFamily="18" charset="0"/>
-                <a:cs typeface="Times New Roman" panose="02020603050405020304" pitchFamily="18" charset="0"/>
-              </a:rPr>
-              <a:t>For instance, </a:t>
-            </a:r>
-            <a:r>
-              <a:rPr lang="en-US" sz="2100" dirty="0">
-                <a:latin typeface="Times New Roman" panose="02020603050405020304" pitchFamily="18" charset="0"/>
-                <a:cs typeface="Times New Roman" panose="02020603050405020304" pitchFamily="18" charset="0"/>
-              </a:rPr>
-              <a:t>you can create an XSLT to convert an XML file containing weather data into a nicely formatted HTML table showing the forecast.</a:t>
-            </a:r>
-          </a:p>
-          <a:p>
-            <a:pPr marL="0" indent="0" algn="just">
-              <a:buNone/>
-            </a:pPr>
-            <a:endParaRPr lang="en-US" sz="2100" dirty="0">
+            <a:pPr marL="457200" lvl="1" indent="0" algn="just">
+              <a:buNone/>
+            </a:pPr>
+            <a:r>
+              <a:rPr lang="en-US" sz="2200" dirty="0">
+                <a:latin typeface="Times New Roman" panose="02020603050405020304" pitchFamily="18" charset="0"/>
+                <a:cs typeface="Times New Roman" panose="02020603050405020304" pitchFamily="18" charset="0"/>
+              </a:rPr>
+              <a:t>&lt;h1 id="demo"&gt;This is a Heading&lt;/h1&gt;</a:t>
+            </a:r>
+          </a:p>
+          <a:p>
+            <a:pPr marL="457200" lvl="1" indent="0" algn="just">
+              <a:buNone/>
+            </a:pPr>
+            <a:endParaRPr lang="en-US" sz="2200" dirty="0">
               <a:latin typeface="Times New Roman" panose="02020603050405020304" pitchFamily="18" charset="0"/>
               <a:cs typeface="Times New Roman" panose="02020603050405020304" pitchFamily="18" charset="0"/>
             </a:endParaRPr>
           </a:p>
           <a:p>
-            <a:pPr marL="0" indent="0" algn="just">
-              <a:buNone/>
-            </a:pPr>
-            <a:endParaRPr lang="en-US" sz="2100" dirty="0">
-              <a:latin typeface="Times New Roman" panose="02020603050405020304" pitchFamily="18" charset="0"/>
-              <a:cs typeface="Times New Roman" panose="02020603050405020304" pitchFamily="18" charset="0"/>
-            </a:endParaRPr>
+            <a:pPr marL="457200" lvl="1" indent="0" algn="just">
+              <a:buNone/>
+            </a:pPr>
+            <a:r>
+              <a:rPr lang="en-US" sz="2200" dirty="0">
+                <a:latin typeface="Times New Roman" panose="02020603050405020304" pitchFamily="18" charset="0"/>
+                <a:cs typeface="Times New Roman" panose="02020603050405020304" pitchFamily="18" charset="0"/>
+              </a:rPr>
+              <a:t>&lt;button type="button“ onclick="</a:t>
+            </a:r>
+            <a:r>
+              <a:rPr lang="en-US" sz="2200" dirty="0" err="1">
+                <a:latin typeface="Times New Roman" panose="02020603050405020304" pitchFamily="18" charset="0"/>
+                <a:cs typeface="Times New Roman" panose="02020603050405020304" pitchFamily="18" charset="0"/>
+              </a:rPr>
+              <a:t>document.getElementById</a:t>
+            </a:r>
+            <a:r>
+              <a:rPr lang="en-US" sz="2200" dirty="0">
+                <a:latin typeface="Times New Roman" panose="02020603050405020304" pitchFamily="18" charset="0"/>
+                <a:cs typeface="Times New Roman" panose="02020603050405020304" pitchFamily="18" charset="0"/>
+              </a:rPr>
+              <a:t>('demo').</a:t>
+            </a:r>
+            <a:r>
+              <a:rPr lang="en-US" sz="2200" dirty="0" err="1">
+                <a:latin typeface="Times New Roman" panose="02020603050405020304" pitchFamily="18" charset="0"/>
+                <a:cs typeface="Times New Roman" panose="02020603050405020304" pitchFamily="18" charset="0"/>
+              </a:rPr>
+              <a:t>innerHTML</a:t>
+            </a:r>
+            <a:r>
+              <a:rPr lang="en-US" sz="2200" dirty="0">
+                <a:latin typeface="Times New Roman" panose="02020603050405020304" pitchFamily="18" charset="0"/>
+                <a:cs typeface="Times New Roman" panose="02020603050405020304" pitchFamily="18" charset="0"/>
+              </a:rPr>
+              <a:t> = 'Hello World!’"&gt; Click Me! &lt;/button&gt;</a:t>
+            </a:r>
           </a:p>
           <a:p>
             <a:pPr algn="just"/>
@@ -21233,6 +21450,45 @@
               <a:cs typeface="Times New Roman" panose="02020603050405020304" pitchFamily="18" charset="0"/>
             </a:endParaRPr>
           </a:p>
+          <a:p>
+            <a:pPr marL="0" indent="0" algn="just">
+              <a:buNone/>
+            </a:pPr>
+            <a:r>
+              <a:rPr lang="en-US" sz="2100" b="1" dirty="0">
+                <a:latin typeface="Times New Roman" panose="02020603050405020304" pitchFamily="18" charset="0"/>
+                <a:cs typeface="Times New Roman" panose="02020603050405020304" pitchFamily="18" charset="0"/>
+              </a:rPr>
+              <a:t>Note: </a:t>
+            </a:r>
+            <a:r>
+              <a:rPr lang="en-US" sz="2100" dirty="0">
+                <a:latin typeface="Times New Roman" panose="02020603050405020304" pitchFamily="18" charset="0"/>
+                <a:cs typeface="Times New Roman" panose="02020603050405020304" pitchFamily="18" charset="0"/>
+              </a:rPr>
+              <a:t>XML DOM Example refer to the </a:t>
+            </a:r>
+            <a:r>
+              <a:rPr lang="en-US" sz="2100">
+                <a:latin typeface="Times New Roman" panose="02020603050405020304" pitchFamily="18" charset="0"/>
+                <a:cs typeface="Times New Roman" panose="02020603050405020304" pitchFamily="18" charset="0"/>
+              </a:rPr>
+              <a:t>GitHub link </a:t>
+            </a:r>
+            <a:endParaRPr lang="en-US" sz="2100" b="1" dirty="0">
+              <a:latin typeface="Times New Roman" panose="02020603050405020304" pitchFamily="18" charset="0"/>
+              <a:cs typeface="Times New Roman" panose="02020603050405020304" pitchFamily="18" charset="0"/>
+            </a:endParaRPr>
+          </a:p>
+          <a:p>
+            <a:pPr marL="0" indent="0" algn="just">
+              <a:buNone/>
+            </a:pPr>
+            <a:endParaRPr lang="en-US" sz="2100" dirty="0">
+              <a:latin typeface="Times New Roman" panose="02020603050405020304" pitchFamily="18" charset="0"/>
+              <a:cs typeface="Times New Roman" panose="02020603050405020304" pitchFamily="18" charset="0"/>
+            </a:endParaRPr>
+          </a:p>
         </p:txBody>
       </p:sp>
       <p:sp>
@@ -21240,7 +21496,7 @@
           <p:cNvPr id="7" name="Date Placeholder 6">
             <a:extLst>
               <a:ext uri="{FF2B5EF4-FFF2-40B4-BE49-F238E27FC236}">
-                <a16:creationId xmlns:a16="http://schemas.microsoft.com/office/drawing/2014/main" id="{EFBEEA68-6739-45B3-AFD6-1D540E4C8395}"/>
+                <a16:creationId xmlns:a16="http://schemas.microsoft.com/office/drawing/2014/main" id="{99DEF407-1CF1-4EAB-A260-EAE06D0F9821}"/>
               </a:ext>
             </a:extLst>
           </p:cNvPr>
@@ -21268,7 +21524,7 @@
           <p:cNvPr id="4" name="Slide Number Placeholder 3">
             <a:extLst>
               <a:ext uri="{FF2B5EF4-FFF2-40B4-BE49-F238E27FC236}">
-                <a16:creationId xmlns:a16="http://schemas.microsoft.com/office/drawing/2014/main" id="{3ADA28D7-3146-4C42-8C5F-F461FFE2A762}"/>
+                <a16:creationId xmlns:a16="http://schemas.microsoft.com/office/drawing/2014/main" id="{392E2389-B17E-4464-AC60-19A20ECF42F5}"/>
               </a:ext>
             </a:extLst>
           </p:cNvPr>
@@ -21295,7 +21551,7 @@
     </p:spTree>
     <p:extLst>
       <p:ext uri="{BB962C8B-B14F-4D97-AF65-F5344CB8AC3E}">
-        <p14:creationId xmlns:p14="http://schemas.microsoft.com/office/powerpoint/2010/main" val="3453713132"/>
+        <p14:creationId xmlns:p14="http://schemas.microsoft.com/office/powerpoint/2010/main" val="320352094"/>
       </p:ext>
     </p:extLst>
   </p:cSld>
@@ -21356,7 +21612,7 @@
                 <a:latin typeface="Times New Roman" panose="02020603050405020304" pitchFamily="18" charset="0"/>
                 <a:cs typeface="Times New Roman" panose="02020603050405020304" pitchFamily="18" charset="0"/>
               </a:rPr>
-              <a:t>Introduction to XQuery</a:t>
+              <a:t>Introduction to XPath</a:t>
             </a:r>
           </a:p>
         </p:txBody>
@@ -21379,8 +21635,8 @@
         </p:nvSpPr>
         <p:spPr>
           <a:xfrm>
-            <a:off x="720757" y="1821730"/>
-            <a:ext cx="10750485" cy="3214539"/>
+            <a:off x="720757" y="1551615"/>
+            <a:ext cx="10750485" cy="3754769"/>
           </a:xfrm>
         </p:spPr>
         <p:txBody>
@@ -21395,14 +21651,14 @@
                 <a:latin typeface="Times New Roman" panose="02020603050405020304" pitchFamily="18" charset="0"/>
                 <a:cs typeface="Times New Roman" panose="02020603050405020304" pitchFamily="18" charset="0"/>
               </a:rPr>
-              <a:t>XQuery (XML Query) </a:t>
-            </a:r>
-            <a:r>
-              <a:rPr lang="en-US" sz="2100" dirty="0">
-                <a:latin typeface="Times New Roman" panose="02020603050405020304" pitchFamily="18" charset="0"/>
-                <a:cs typeface="Times New Roman" panose="02020603050405020304" pitchFamily="18" charset="0"/>
-              </a:rPr>
-              <a:t>is a language designed for querying and extracting data from XML documents.</a:t>
+              <a:t>XPath (XML Path Language) </a:t>
+            </a:r>
+            <a:r>
+              <a:rPr lang="en-US" sz="2100" dirty="0">
+                <a:latin typeface="Times New Roman" panose="02020603050405020304" pitchFamily="18" charset="0"/>
+                <a:cs typeface="Times New Roman" panose="02020603050405020304" pitchFamily="18" charset="0"/>
+              </a:rPr>
+              <a:t>is a language used to navigate and select elements and attributes in XML documents.</a:t>
             </a:r>
           </a:p>
           <a:p>
@@ -21412,7 +21668,7 @@
                 <a:latin typeface="Times New Roman" panose="02020603050405020304" pitchFamily="18" charset="0"/>
                 <a:cs typeface="Times New Roman" panose="02020603050405020304" pitchFamily="18" charset="0"/>
               </a:rPr>
-              <a:t>If XPath is a navigation tool, XQuery is a querying tool for XML documents.</a:t>
+              <a:t>Imagine an XML document as a tree-like structure, with elements (nodes) and attributes (properties).</a:t>
             </a:r>
           </a:p>
           <a:p>
@@ -21422,7 +21678,7 @@
                 <a:latin typeface="Times New Roman" panose="02020603050405020304" pitchFamily="18" charset="0"/>
                 <a:cs typeface="Times New Roman" panose="02020603050405020304" pitchFamily="18" charset="0"/>
               </a:rPr>
-              <a:t>It allows you to ask questions and retrieve specific pieces of data from XML documents.</a:t>
+              <a:t>XPath is like a map that helps you navigate this tree and find specific elements or attributes you're interested in.</a:t>
             </a:r>
           </a:p>
           <a:p>
@@ -21432,7 +21688,7 @@
                 <a:latin typeface="Times New Roman" panose="02020603050405020304" pitchFamily="18" charset="0"/>
                 <a:cs typeface="Times New Roman" panose="02020603050405020304" pitchFamily="18" charset="0"/>
               </a:rPr>
-              <a:t>You can use XQuery to filter, sort, and extract information based on certain conditions or criteria.</a:t>
+              <a:t>It uses a concise syntax to describe paths to reach nodes, similar to directories in a file system.</a:t>
             </a:r>
           </a:p>
           <a:p>
@@ -21449,8 +21705,57 @@
                 <a:latin typeface="Times New Roman" panose="02020603050405020304" pitchFamily="18" charset="0"/>
                 <a:cs typeface="Times New Roman" panose="02020603050405020304" pitchFamily="18" charset="0"/>
               </a:rPr>
-              <a:t>in a large XML database of products, XQuery can help you find all products with prices below a certain value.</a:t>
-            </a:r>
+              <a:t>given an XML document representing books, the XPath expression “</a:t>
+            </a:r>
+            <a:r>
+              <a:rPr lang="en-US" sz="2100" b="1" dirty="0">
+                <a:latin typeface="Times New Roman" panose="02020603050405020304" pitchFamily="18" charset="0"/>
+                <a:cs typeface="Times New Roman" panose="02020603050405020304" pitchFamily="18" charset="0"/>
+              </a:rPr>
+              <a:t>/books/book[1]/title”</a:t>
+            </a:r>
+            <a:r>
+              <a:rPr lang="en-US" sz="2100" dirty="0">
+                <a:latin typeface="Times New Roman" panose="02020603050405020304" pitchFamily="18" charset="0"/>
+                <a:cs typeface="Times New Roman" panose="02020603050405020304" pitchFamily="18" charset="0"/>
+              </a:rPr>
+              <a:t> points to the title of the first book in the "books" element.</a:t>
+            </a:r>
+          </a:p>
+          <a:p>
+            <a:pPr algn="just"/>
+            <a:r>
+              <a:rPr lang="en-US" sz="2100" b="1" dirty="0">
+                <a:latin typeface="Times New Roman" panose="02020603050405020304" pitchFamily="18" charset="0"/>
+                <a:cs typeface="Times New Roman" panose="02020603050405020304" pitchFamily="18" charset="0"/>
+              </a:rPr>
+              <a:t>Note: </a:t>
+            </a:r>
+            <a:r>
+              <a:rPr lang="en-US" sz="2100" dirty="0">
+                <a:latin typeface="Times New Roman" panose="02020603050405020304" pitchFamily="18" charset="0"/>
+                <a:cs typeface="Times New Roman" panose="02020603050405020304" pitchFamily="18" charset="0"/>
+              </a:rPr>
+              <a:t>In XPath, the index for nodes or elements start from 1 not 0.</a:t>
+            </a:r>
+          </a:p>
+          <a:p>
+            <a:pPr marL="0" indent="0" algn="just">
+              <a:buNone/>
+            </a:pPr>
+            <a:endParaRPr lang="en-US" sz="2100" dirty="0">
+              <a:latin typeface="Times New Roman" panose="02020603050405020304" pitchFamily="18" charset="0"/>
+              <a:cs typeface="Times New Roman" panose="02020603050405020304" pitchFamily="18" charset="0"/>
+            </a:endParaRPr>
+          </a:p>
+          <a:p>
+            <a:pPr marL="0" indent="0" algn="just">
+              <a:buNone/>
+            </a:pPr>
+            <a:endParaRPr lang="en-US" sz="2100" dirty="0">
+              <a:latin typeface="Times New Roman" panose="02020603050405020304" pitchFamily="18" charset="0"/>
+              <a:cs typeface="Times New Roman" panose="02020603050405020304" pitchFamily="18" charset="0"/>
+            </a:endParaRPr>
           </a:p>
           <a:p>
             <a:pPr marL="0" indent="0" algn="just">
@@ -21475,7 +21780,7 @@
           <p:cNvPr id="7" name="Date Placeholder 6">
             <a:extLst>
               <a:ext uri="{FF2B5EF4-FFF2-40B4-BE49-F238E27FC236}">
-                <a16:creationId xmlns:a16="http://schemas.microsoft.com/office/drawing/2014/main" id="{7F6DE067-0F1B-4A18-8050-C903D69658AB}"/>
+                <a16:creationId xmlns:a16="http://schemas.microsoft.com/office/drawing/2014/main" id="{99DEF407-1CF1-4EAB-A260-EAE06D0F9821}"/>
               </a:ext>
             </a:extLst>
           </p:cNvPr>
@@ -21503,7 +21808,7 @@
           <p:cNvPr id="4" name="Slide Number Placeholder 3">
             <a:extLst>
               <a:ext uri="{FF2B5EF4-FFF2-40B4-BE49-F238E27FC236}">
-                <a16:creationId xmlns:a16="http://schemas.microsoft.com/office/drawing/2014/main" id="{4F4605F7-8101-4667-99E3-6A1800DDE08C}"/>
+                <a16:creationId xmlns:a16="http://schemas.microsoft.com/office/drawing/2014/main" id="{392E2389-B17E-4464-AC60-19A20ECF42F5}"/>
               </a:ext>
             </a:extLst>
           </p:cNvPr>
@@ -21530,7 +21835,7 @@
     </p:spTree>
     <p:extLst>
       <p:ext uri="{BB962C8B-B14F-4D97-AF65-F5344CB8AC3E}">
-        <p14:creationId xmlns:p14="http://schemas.microsoft.com/office/powerpoint/2010/main" val="42828824"/>
+        <p14:creationId xmlns:p14="http://schemas.microsoft.com/office/powerpoint/2010/main" val="1808556204"/>
       </p:ext>
     </p:extLst>
   </p:cSld>
@@ -21575,8 +21880,8 @@
         </p:nvSpPr>
         <p:spPr>
           <a:xfrm>
-            <a:off x="838200" y="2879726"/>
-            <a:ext cx="10515600" cy="768350"/>
+            <a:off x="838200" y="136525"/>
+            <a:ext cx="10515600" cy="702461"/>
           </a:xfrm>
         </p:spPr>
         <p:txBody>
@@ -21591,17 +21896,132 @@
                 <a:latin typeface="Times New Roman" panose="02020603050405020304" pitchFamily="18" charset="0"/>
                 <a:cs typeface="Times New Roman" panose="02020603050405020304" pitchFamily="18" charset="0"/>
               </a:rPr>
-              <a:t>THANK YOU!</a:t>
-            </a:r>
-          </a:p>
-        </p:txBody>
-      </p:sp>
-      <p:sp>
-        <p:nvSpPr>
-          <p:cNvPr id="6" name="Date Placeholder 5">
-            <a:extLst>
-              <a:ext uri="{FF2B5EF4-FFF2-40B4-BE49-F238E27FC236}">
-                <a16:creationId xmlns:a16="http://schemas.microsoft.com/office/drawing/2014/main" id="{74BB67E4-790A-4677-9783-EFF7E23A7CA7}"/>
+              <a:t>Introduction to XSLT</a:t>
+            </a:r>
+          </a:p>
+        </p:txBody>
+      </p:sp>
+      <p:sp>
+        <p:nvSpPr>
+          <p:cNvPr id="3" name="Content Placeholder 2">
+            <a:extLst>
+              <a:ext uri="{FF2B5EF4-FFF2-40B4-BE49-F238E27FC236}">
+                <a16:creationId xmlns:a16="http://schemas.microsoft.com/office/drawing/2014/main" id="{3606C04B-371F-4848-8AA7-EA95F1E40BD8}"/>
+              </a:ext>
+            </a:extLst>
+          </p:cNvPr>
+          <p:cNvSpPr>
+            <a:spLocks noGrp="1"/>
+          </p:cNvSpPr>
+          <p:nvPr>
+            <p:ph idx="1"/>
+          </p:nvPr>
+        </p:nvSpPr>
+        <p:spPr>
+          <a:xfrm>
+            <a:off x="838200" y="1821730"/>
+            <a:ext cx="10750485" cy="3214539"/>
+          </a:xfrm>
+        </p:spPr>
+        <p:txBody>
+          <a:bodyPr>
+            <a:normAutofit/>
+          </a:bodyPr>
+          <a:lstStyle/>
+          <a:p>
+            <a:pPr algn="just"/>
+            <a:r>
+              <a:rPr lang="en-US" sz="2100" b="1" dirty="0" err="1">
+                <a:latin typeface="Times New Roman" panose="02020603050405020304" pitchFamily="18" charset="0"/>
+                <a:cs typeface="Times New Roman" panose="02020603050405020304" pitchFamily="18" charset="0"/>
+              </a:rPr>
+              <a:t>eXtensible</a:t>
+            </a:r>
+            <a:r>
+              <a:rPr lang="en-US" sz="2100" b="1" dirty="0">
+                <a:latin typeface="Times New Roman" panose="02020603050405020304" pitchFamily="18" charset="0"/>
+                <a:cs typeface="Times New Roman" panose="02020603050405020304" pitchFamily="18" charset="0"/>
+              </a:rPr>
+              <a:t> Stylesheet Language Transformations (XSLT) </a:t>
+            </a:r>
+            <a:r>
+              <a:rPr lang="en-US" sz="2100" dirty="0">
+                <a:latin typeface="Times New Roman" panose="02020603050405020304" pitchFamily="18" charset="0"/>
+                <a:cs typeface="Times New Roman" panose="02020603050405020304" pitchFamily="18" charset="0"/>
+              </a:rPr>
+              <a:t>is like a set of rules or templates that instruct how to transform XML data into a different format.</a:t>
+            </a:r>
+          </a:p>
+          <a:p>
+            <a:pPr algn="just"/>
+            <a:r>
+              <a:rPr lang="en-US" sz="2100" dirty="0">
+                <a:latin typeface="Times New Roman" panose="02020603050405020304" pitchFamily="18" charset="0"/>
+                <a:cs typeface="Times New Roman" panose="02020603050405020304" pitchFamily="18" charset="0"/>
+              </a:rPr>
+              <a:t>You define these templates to specify how to display, format, or extract data from the XML document.</a:t>
+            </a:r>
+          </a:p>
+          <a:p>
+            <a:pPr algn="just"/>
+            <a:r>
+              <a:rPr lang="en-US" sz="2100" dirty="0">
+                <a:latin typeface="Times New Roman" panose="02020603050405020304" pitchFamily="18" charset="0"/>
+                <a:cs typeface="Times New Roman" panose="02020603050405020304" pitchFamily="18" charset="0"/>
+              </a:rPr>
+              <a:t>Think of XSLT as a recipe that takes an XML input and turns it into another XML, HTML, or even plain text output.</a:t>
+            </a:r>
+          </a:p>
+          <a:p>
+            <a:pPr algn="just"/>
+            <a:r>
+              <a:rPr lang="en-US" sz="2100" b="1" dirty="0">
+                <a:latin typeface="Times New Roman" panose="02020603050405020304" pitchFamily="18" charset="0"/>
+                <a:cs typeface="Times New Roman" panose="02020603050405020304" pitchFamily="18" charset="0"/>
+              </a:rPr>
+              <a:t>For instance, </a:t>
+            </a:r>
+            <a:r>
+              <a:rPr lang="en-US" sz="2100" dirty="0">
+                <a:latin typeface="Times New Roman" panose="02020603050405020304" pitchFamily="18" charset="0"/>
+                <a:cs typeface="Times New Roman" panose="02020603050405020304" pitchFamily="18" charset="0"/>
+              </a:rPr>
+              <a:t>you can create an XSLT to convert an XML file containing weather data into a nicely formatted HTML table showing the forecast.</a:t>
+            </a:r>
+          </a:p>
+          <a:p>
+            <a:pPr marL="0" indent="0" algn="just">
+              <a:buNone/>
+            </a:pPr>
+            <a:endParaRPr lang="en-US" sz="2100" dirty="0">
+              <a:latin typeface="Times New Roman" panose="02020603050405020304" pitchFamily="18" charset="0"/>
+              <a:cs typeface="Times New Roman" panose="02020603050405020304" pitchFamily="18" charset="0"/>
+            </a:endParaRPr>
+          </a:p>
+          <a:p>
+            <a:pPr marL="0" indent="0" algn="just">
+              <a:buNone/>
+            </a:pPr>
+            <a:endParaRPr lang="en-US" sz="2100" dirty="0">
+              <a:latin typeface="Times New Roman" panose="02020603050405020304" pitchFamily="18" charset="0"/>
+              <a:cs typeface="Times New Roman" panose="02020603050405020304" pitchFamily="18" charset="0"/>
+            </a:endParaRPr>
+          </a:p>
+          <a:p>
+            <a:pPr algn="just"/>
+            <a:endParaRPr lang="en-US" sz="2100" dirty="0">
+              <a:latin typeface="Times New Roman" panose="02020603050405020304" pitchFamily="18" charset="0"/>
+              <a:cs typeface="Times New Roman" panose="02020603050405020304" pitchFamily="18" charset="0"/>
+            </a:endParaRPr>
+          </a:p>
+        </p:txBody>
+      </p:sp>
+      <p:sp>
+        <p:nvSpPr>
+          <p:cNvPr id="7" name="Date Placeholder 6">
+            <a:extLst>
+              <a:ext uri="{FF2B5EF4-FFF2-40B4-BE49-F238E27FC236}">
+                <a16:creationId xmlns:a16="http://schemas.microsoft.com/office/drawing/2014/main" id="{EFBEEA68-6739-45B3-AFD6-1D540E4C8395}"/>
               </a:ext>
             </a:extLst>
           </p:cNvPr>
@@ -21626,10 +22046,10 @@
       </p:sp>
       <p:sp>
         <p:nvSpPr>
-          <p:cNvPr id="3" name="Slide Number Placeholder 2">
-            <a:extLst>
-              <a:ext uri="{FF2B5EF4-FFF2-40B4-BE49-F238E27FC236}">
-                <a16:creationId xmlns:a16="http://schemas.microsoft.com/office/drawing/2014/main" id="{A50EBBC2-BA54-4520-945C-70C4CF71F406}"/>
+          <p:cNvPr id="4" name="Slide Number Placeholder 3">
+            <a:extLst>
+              <a:ext uri="{FF2B5EF4-FFF2-40B4-BE49-F238E27FC236}">
+                <a16:creationId xmlns:a16="http://schemas.microsoft.com/office/drawing/2014/main" id="{3ADA28D7-3146-4C42-8C5F-F461FFE2A762}"/>
               </a:ext>
             </a:extLst>
           </p:cNvPr>
@@ -21656,7 +22076,242 @@
     </p:spTree>
     <p:extLst>
       <p:ext uri="{BB962C8B-B14F-4D97-AF65-F5344CB8AC3E}">
-        <p14:creationId xmlns:p14="http://schemas.microsoft.com/office/powerpoint/2010/main" val="2228834683"/>
+        <p14:creationId xmlns:p14="http://schemas.microsoft.com/office/powerpoint/2010/main" val="3453713132"/>
+      </p:ext>
+    </p:extLst>
+  </p:cSld>
+  <p:clrMapOvr>
+    <a:masterClrMapping/>
+  </p:clrMapOvr>
+</p:sld>
+</file>
+
+<file path=ppt/slides/slide49.xml><?xml version="1.0" encoding="utf-8"?>
+<p:sld xmlns:a="http://schemas.openxmlformats.org/drawingml/2006/main" xmlns:r="http://schemas.openxmlformats.org/officeDocument/2006/relationships" xmlns:p="http://schemas.openxmlformats.org/presentationml/2006/main">
+  <p:cSld>
+    <p:spTree>
+      <p:nvGrpSpPr>
+        <p:cNvPr id="1" name=""/>
+        <p:cNvGrpSpPr/>
+        <p:nvPr/>
+      </p:nvGrpSpPr>
+      <p:grpSpPr>
+        <a:xfrm>
+          <a:off x="0" y="0"/>
+          <a:ext cx="0" cy="0"/>
+          <a:chOff x="0" y="0"/>
+          <a:chExt cx="0" cy="0"/>
+        </a:xfrm>
+      </p:grpSpPr>
+      <p:sp>
+        <p:nvSpPr>
+          <p:cNvPr id="2" name="Title 1">
+            <a:extLst>
+              <a:ext uri="{FF2B5EF4-FFF2-40B4-BE49-F238E27FC236}">
+                <a16:creationId xmlns:a16="http://schemas.microsoft.com/office/drawing/2014/main" id="{99E3D417-29FA-4A9F-BAA7-D67479087C5B}"/>
+              </a:ext>
+            </a:extLst>
+          </p:cNvPr>
+          <p:cNvSpPr>
+            <a:spLocks noGrp="1"/>
+          </p:cNvSpPr>
+          <p:nvPr>
+            <p:ph type="title"/>
+          </p:nvPr>
+        </p:nvSpPr>
+        <p:spPr>
+          <a:xfrm>
+            <a:off x="838200" y="136525"/>
+            <a:ext cx="10515600" cy="702461"/>
+          </a:xfrm>
+        </p:spPr>
+        <p:txBody>
+          <a:bodyPr>
+            <a:normAutofit/>
+          </a:bodyPr>
+          <a:lstStyle/>
+          <a:p>
+            <a:pPr algn="ctr"/>
+            <a:r>
+              <a:rPr lang="en-US" sz="4000" b="1" dirty="0">
+                <a:latin typeface="Times New Roman" panose="02020603050405020304" pitchFamily="18" charset="0"/>
+                <a:cs typeface="Times New Roman" panose="02020603050405020304" pitchFamily="18" charset="0"/>
+              </a:rPr>
+              <a:t>Introduction to XQuery</a:t>
+            </a:r>
+          </a:p>
+        </p:txBody>
+      </p:sp>
+      <p:sp>
+        <p:nvSpPr>
+          <p:cNvPr id="3" name="Content Placeholder 2">
+            <a:extLst>
+              <a:ext uri="{FF2B5EF4-FFF2-40B4-BE49-F238E27FC236}">
+                <a16:creationId xmlns:a16="http://schemas.microsoft.com/office/drawing/2014/main" id="{3606C04B-371F-4848-8AA7-EA95F1E40BD8}"/>
+              </a:ext>
+            </a:extLst>
+          </p:cNvPr>
+          <p:cNvSpPr>
+            <a:spLocks noGrp="1"/>
+          </p:cNvSpPr>
+          <p:nvPr>
+            <p:ph idx="1"/>
+          </p:nvPr>
+        </p:nvSpPr>
+        <p:spPr>
+          <a:xfrm>
+            <a:off x="720757" y="1821730"/>
+            <a:ext cx="10750485" cy="3214539"/>
+          </a:xfrm>
+        </p:spPr>
+        <p:txBody>
+          <a:bodyPr>
+            <a:normAutofit/>
+          </a:bodyPr>
+          <a:lstStyle/>
+          <a:p>
+            <a:pPr algn="just"/>
+            <a:r>
+              <a:rPr lang="en-US" sz="2100" b="1" dirty="0">
+                <a:latin typeface="Times New Roman" panose="02020603050405020304" pitchFamily="18" charset="0"/>
+                <a:cs typeface="Times New Roman" panose="02020603050405020304" pitchFamily="18" charset="0"/>
+              </a:rPr>
+              <a:t>XQuery (XML Query) </a:t>
+            </a:r>
+            <a:r>
+              <a:rPr lang="en-US" sz="2100" dirty="0">
+                <a:latin typeface="Times New Roman" panose="02020603050405020304" pitchFamily="18" charset="0"/>
+                <a:cs typeface="Times New Roman" panose="02020603050405020304" pitchFamily="18" charset="0"/>
+              </a:rPr>
+              <a:t>is a language designed for querying and extracting data from XML documents.</a:t>
+            </a:r>
+          </a:p>
+          <a:p>
+            <a:pPr algn="just"/>
+            <a:r>
+              <a:rPr lang="en-US" sz="2100" dirty="0">
+                <a:latin typeface="Times New Roman" panose="02020603050405020304" pitchFamily="18" charset="0"/>
+                <a:cs typeface="Times New Roman" panose="02020603050405020304" pitchFamily="18" charset="0"/>
+              </a:rPr>
+              <a:t>If XPath is a navigation tool, XQuery is a querying tool for XML documents.</a:t>
+            </a:r>
+          </a:p>
+          <a:p>
+            <a:pPr algn="just"/>
+            <a:r>
+              <a:rPr lang="en-US" sz="2100" dirty="0">
+                <a:latin typeface="Times New Roman" panose="02020603050405020304" pitchFamily="18" charset="0"/>
+                <a:cs typeface="Times New Roman" panose="02020603050405020304" pitchFamily="18" charset="0"/>
+              </a:rPr>
+              <a:t>It allows you to ask questions and retrieve specific pieces of data from XML documents.</a:t>
+            </a:r>
+          </a:p>
+          <a:p>
+            <a:pPr algn="just"/>
+            <a:r>
+              <a:rPr lang="en-US" sz="2100" dirty="0">
+                <a:latin typeface="Times New Roman" panose="02020603050405020304" pitchFamily="18" charset="0"/>
+                <a:cs typeface="Times New Roman" panose="02020603050405020304" pitchFamily="18" charset="0"/>
+              </a:rPr>
+              <a:t>You can use XQuery to filter, sort, and extract information based on certain conditions or criteria.</a:t>
+            </a:r>
+          </a:p>
+          <a:p>
+            <a:pPr algn="just"/>
+            <a:r>
+              <a:rPr lang="en-US" sz="2100" b="1" dirty="0">
+                <a:latin typeface="Times New Roman" panose="02020603050405020304" pitchFamily="18" charset="0"/>
+                <a:cs typeface="Times New Roman" panose="02020603050405020304" pitchFamily="18" charset="0"/>
+              </a:rPr>
+              <a:t>For example, </a:t>
+            </a:r>
+            <a:r>
+              <a:rPr lang="en-US" sz="2100" dirty="0">
+                <a:latin typeface="Times New Roman" panose="02020603050405020304" pitchFamily="18" charset="0"/>
+                <a:cs typeface="Times New Roman" panose="02020603050405020304" pitchFamily="18" charset="0"/>
+              </a:rPr>
+              <a:t>in a large XML database of products, XQuery can help you find all products with prices below a certain value.</a:t>
+            </a:r>
+          </a:p>
+          <a:p>
+            <a:pPr marL="0" indent="0" algn="just">
+              <a:buNone/>
+            </a:pPr>
+            <a:endParaRPr lang="en-US" sz="2100" dirty="0">
+              <a:latin typeface="Times New Roman" panose="02020603050405020304" pitchFamily="18" charset="0"/>
+              <a:cs typeface="Times New Roman" panose="02020603050405020304" pitchFamily="18" charset="0"/>
+            </a:endParaRPr>
+          </a:p>
+          <a:p>
+            <a:pPr algn="just"/>
+            <a:endParaRPr lang="en-US" sz="2100" dirty="0">
+              <a:latin typeface="Times New Roman" panose="02020603050405020304" pitchFamily="18" charset="0"/>
+              <a:cs typeface="Times New Roman" panose="02020603050405020304" pitchFamily="18" charset="0"/>
+            </a:endParaRPr>
+          </a:p>
+        </p:txBody>
+      </p:sp>
+      <p:sp>
+        <p:nvSpPr>
+          <p:cNvPr id="7" name="Date Placeholder 6">
+            <a:extLst>
+              <a:ext uri="{FF2B5EF4-FFF2-40B4-BE49-F238E27FC236}">
+                <a16:creationId xmlns:a16="http://schemas.microsoft.com/office/drawing/2014/main" id="{7F6DE067-0F1B-4A18-8050-C903D69658AB}"/>
+              </a:ext>
+            </a:extLst>
+          </p:cNvPr>
+          <p:cNvSpPr>
+            <a:spLocks noGrp="1"/>
+          </p:cNvSpPr>
+          <p:nvPr>
+            <p:ph type="dt" sz="half" idx="10"/>
+          </p:nvPr>
+        </p:nvSpPr>
+        <p:spPr/>
+        <p:txBody>
+          <a:bodyPr/>
+          <a:lstStyle/>
+          <a:p>
+            <a:r>
+              <a:rPr lang="en-US"/>
+              <a:t>3/22/2024</a:t>
+            </a:r>
+          </a:p>
+        </p:txBody>
+      </p:sp>
+      <p:sp>
+        <p:nvSpPr>
+          <p:cNvPr id="4" name="Slide Number Placeholder 3">
+            <a:extLst>
+              <a:ext uri="{FF2B5EF4-FFF2-40B4-BE49-F238E27FC236}">
+                <a16:creationId xmlns:a16="http://schemas.microsoft.com/office/drawing/2014/main" id="{4F4605F7-8101-4667-99E3-6A1800DDE08C}"/>
+              </a:ext>
+            </a:extLst>
+          </p:cNvPr>
+          <p:cNvSpPr>
+            <a:spLocks noGrp="1"/>
+          </p:cNvSpPr>
+          <p:nvPr>
+            <p:ph type="sldNum" sz="quarter" idx="12"/>
+          </p:nvPr>
+        </p:nvSpPr>
+        <p:spPr/>
+        <p:txBody>
+          <a:bodyPr/>
+          <a:lstStyle/>
+          <a:p>
+            <a:fld id="{AEF75223-61B2-4F69-BE7E-5D6945408756}" type="slidenum">
+              <a:rPr lang="en-US" smtClean="0"/>
+              <a:t>49</a:t>
+            </a:fld>
+            <a:endParaRPr lang="en-US"/>
+          </a:p>
+        </p:txBody>
+      </p:sp>
+    </p:spTree>
+    <p:extLst>
+      <p:ext uri="{BB962C8B-B14F-4D97-AF65-F5344CB8AC3E}">
+        <p14:creationId xmlns:p14="http://schemas.microsoft.com/office/powerpoint/2010/main" val="42828824"/>
       </p:ext>
     </p:extLst>
   </p:cSld>
@@ -22120,6 +22775,132 @@
     <p:extLst>
       <p:ext uri="{BB962C8B-B14F-4D97-AF65-F5344CB8AC3E}">
         <p14:creationId xmlns:p14="http://schemas.microsoft.com/office/powerpoint/2010/main" val="2516339467"/>
+      </p:ext>
+    </p:extLst>
+  </p:cSld>
+  <p:clrMapOvr>
+    <a:masterClrMapping/>
+  </p:clrMapOvr>
+</p:sld>
+</file>
+
+<file path=ppt/slides/slide50.xml><?xml version="1.0" encoding="utf-8"?>
+<p:sld xmlns:a="http://schemas.openxmlformats.org/drawingml/2006/main" xmlns:r="http://schemas.openxmlformats.org/officeDocument/2006/relationships" xmlns:p="http://schemas.openxmlformats.org/presentationml/2006/main">
+  <p:cSld>
+    <p:spTree>
+      <p:nvGrpSpPr>
+        <p:cNvPr id="1" name=""/>
+        <p:cNvGrpSpPr/>
+        <p:nvPr/>
+      </p:nvGrpSpPr>
+      <p:grpSpPr>
+        <a:xfrm>
+          <a:off x="0" y="0"/>
+          <a:ext cx="0" cy="0"/>
+          <a:chOff x="0" y="0"/>
+          <a:chExt cx="0" cy="0"/>
+        </a:xfrm>
+      </p:grpSpPr>
+      <p:sp>
+        <p:nvSpPr>
+          <p:cNvPr id="2" name="Title 1">
+            <a:extLst>
+              <a:ext uri="{FF2B5EF4-FFF2-40B4-BE49-F238E27FC236}">
+                <a16:creationId xmlns:a16="http://schemas.microsoft.com/office/drawing/2014/main" id="{99E3D417-29FA-4A9F-BAA7-D67479087C5B}"/>
+              </a:ext>
+            </a:extLst>
+          </p:cNvPr>
+          <p:cNvSpPr>
+            <a:spLocks noGrp="1"/>
+          </p:cNvSpPr>
+          <p:nvPr>
+            <p:ph type="title"/>
+          </p:nvPr>
+        </p:nvSpPr>
+        <p:spPr>
+          <a:xfrm>
+            <a:off x="838200" y="2879726"/>
+            <a:ext cx="10515600" cy="768350"/>
+          </a:xfrm>
+        </p:spPr>
+        <p:txBody>
+          <a:bodyPr>
+            <a:normAutofit/>
+          </a:bodyPr>
+          <a:lstStyle/>
+          <a:p>
+            <a:pPr algn="ctr"/>
+            <a:r>
+              <a:rPr lang="en-US" sz="4000" b="1" dirty="0">
+                <a:latin typeface="Times New Roman" panose="02020603050405020304" pitchFamily="18" charset="0"/>
+                <a:cs typeface="Times New Roman" panose="02020603050405020304" pitchFamily="18" charset="0"/>
+              </a:rPr>
+              <a:t>THANK YOU!</a:t>
+            </a:r>
+          </a:p>
+        </p:txBody>
+      </p:sp>
+      <p:sp>
+        <p:nvSpPr>
+          <p:cNvPr id="6" name="Date Placeholder 5">
+            <a:extLst>
+              <a:ext uri="{FF2B5EF4-FFF2-40B4-BE49-F238E27FC236}">
+                <a16:creationId xmlns:a16="http://schemas.microsoft.com/office/drawing/2014/main" id="{74BB67E4-790A-4677-9783-EFF7E23A7CA7}"/>
+              </a:ext>
+            </a:extLst>
+          </p:cNvPr>
+          <p:cNvSpPr>
+            <a:spLocks noGrp="1"/>
+          </p:cNvSpPr>
+          <p:nvPr>
+            <p:ph type="dt" sz="half" idx="10"/>
+          </p:nvPr>
+        </p:nvSpPr>
+        <p:spPr/>
+        <p:txBody>
+          <a:bodyPr/>
+          <a:lstStyle/>
+          <a:p>
+            <a:r>
+              <a:rPr lang="en-US"/>
+              <a:t>3/22/2024</a:t>
+            </a:r>
+          </a:p>
+        </p:txBody>
+      </p:sp>
+      <p:sp>
+        <p:nvSpPr>
+          <p:cNvPr id="3" name="Slide Number Placeholder 2">
+            <a:extLst>
+              <a:ext uri="{FF2B5EF4-FFF2-40B4-BE49-F238E27FC236}">
+                <a16:creationId xmlns:a16="http://schemas.microsoft.com/office/drawing/2014/main" id="{A50EBBC2-BA54-4520-945C-70C4CF71F406}"/>
+              </a:ext>
+            </a:extLst>
+          </p:cNvPr>
+          <p:cNvSpPr>
+            <a:spLocks noGrp="1"/>
+          </p:cNvSpPr>
+          <p:nvPr>
+            <p:ph type="sldNum" sz="quarter" idx="12"/>
+          </p:nvPr>
+        </p:nvSpPr>
+        <p:spPr/>
+        <p:txBody>
+          <a:bodyPr/>
+          <a:lstStyle/>
+          <a:p>
+            <a:fld id="{AEF75223-61B2-4F69-BE7E-5D6945408756}" type="slidenum">
+              <a:rPr lang="en-US" smtClean="0"/>
+              <a:t>50</a:t>
+            </a:fld>
+            <a:endParaRPr lang="en-US"/>
+          </a:p>
+        </p:txBody>
+      </p:sp>
+    </p:spTree>
+    <p:extLst>
+      <p:ext uri="{BB962C8B-B14F-4D97-AF65-F5344CB8AC3E}">
+        <p14:creationId xmlns:p14="http://schemas.microsoft.com/office/powerpoint/2010/main" val="2228834683"/>
       </p:ext>
     </p:extLst>
   </p:cSld>

</xml_diff>

<commit_message>
new updates for chapter three
</commit_message>
<xml_diff>
--- a/Unit Three.pptx
+++ b/Unit Three.pptx
@@ -21469,11 +21469,12 @@
               <a:t>XML DOM Example refer to the </a:t>
             </a:r>
             <a:r>
-              <a:rPr lang="en-US" sz="2100">
-                <a:latin typeface="Times New Roman" panose="02020603050405020304" pitchFamily="18" charset="0"/>
-                <a:cs typeface="Times New Roman" panose="02020603050405020304" pitchFamily="18" charset="0"/>
-              </a:rPr>
-              <a:t>GitHub link </a:t>
+              <a:rPr lang="en-US" sz="2100" dirty="0">
+                <a:latin typeface="Times New Roman" panose="02020603050405020304" pitchFamily="18" charset="0"/>
+                <a:cs typeface="Times New Roman" panose="02020603050405020304" pitchFamily="18" charset="0"/>
+                <a:hlinkClick r:id="rId3"/>
+              </a:rPr>
+              <a:t>GitHub Link</a:t>
             </a:r>
             <a:endParaRPr lang="en-US" sz="2100" b="1" dirty="0">
               <a:latin typeface="Times New Roman" panose="02020603050405020304" pitchFamily="18" charset="0"/>

</xml_diff>